<commit_message>
feat: remoce card adding from instructions
</commit_message>
<xml_diff>
--- a/CICD.pptx
+++ b/CICD.pptx
@@ -383,7 +383,7 @@
           <a:p>
             <a:fld id="{13F6AEEE-E778-402E-8B8F-9A98AED26EB8}" type="datetimeFigureOut">
               <a:rPr lang="en-GB" sz="1000" smtClean="0"/>
-              <a:t>10/02/2021</a:t>
+              <a:t>11/02/2021</a:t>
             </a:fld>
             <a:endParaRPr lang="en-GB" sz="1000"/>
           </a:p>
@@ -543,7 +543,7 @@
             <a:fld id="{1386E511-D742-4EFE-90B5-C9FC42762E0F}" type="datetimeFigureOut">
               <a:rPr lang="en-GB" smtClean="0"/>
               <a:pPr/>
-              <a:t>10/02/2021</a:t>
+              <a:t>11/02/2021</a:t>
             </a:fld>
             <a:endParaRPr lang="en-GB"/>
           </a:p>
@@ -21410,13 +21410,8 @@
           <a:p>
             <a:r>
               <a:rPr lang="en-US" sz="3200" dirty="0"/>
-              <a:t>Code deploying in </a:t>
-            </a:r>
-            <a:r>
-              <a:rPr lang="en-US" sz="3200" dirty="0" err="1"/>
-              <a:t>produdction</a:t>
-            </a:r>
-            <a:endParaRPr lang="en-US" sz="3200" dirty="0"/>
+              <a:t>Code deploying in production</a:t>
+            </a:r>
           </a:p>
           <a:p>
             <a:endParaRPr lang="en-US" sz="2000" dirty="0"/>
@@ -24973,6 +24968,12 @@
 </file>
 
 <file path=customXml/item1.xml><?xml version="1.0" encoding="utf-8"?>
+<p:properties xmlns:p="http://schemas.microsoft.com/office/2006/metadata/properties" xmlns:xsi="http://www.w3.org/2001/XMLSchema-instance" xmlns:pc="http://schemas.microsoft.com/office/infopath/2007/PartnerControls">
+  <documentManagement/>
+</p:properties>
+</file>
+
+<file path=customXml/item2.xml><?xml version="1.0" encoding="utf-8"?>
 <ct:contentTypeSchema xmlns:ct="http://schemas.microsoft.com/office/2006/metadata/contentType" xmlns:ma="http://schemas.microsoft.com/office/2006/metadata/properties/metaAttributes" ct:_="" ma:_="" ma:contentTypeName="Document" ma:contentTypeID="0x01010019ED4169A17A9943A0C4D616F29F7EA9" ma:contentTypeVersion="2" ma:contentTypeDescription="Create a new document." ma:contentTypeScope="" ma:versionID="ee2590c771e3efcf6e927d932d0f80bf">
   <xsd:schema xmlns:xsd="http://www.w3.org/2001/XMLSchema" xmlns:xs="http://www.w3.org/2001/XMLSchema" xmlns:p="http://schemas.microsoft.com/office/2006/metadata/properties" xmlns:ns2="6ed449f5-9e03-46ec-8941-bbdaa84be2a0" targetNamespace="http://schemas.microsoft.com/office/2006/metadata/properties" ma:root="true" ma:fieldsID="14228b68809949e600f8d74e51d27844" ns2:_="">
     <xsd:import namespace="6ed449f5-9e03-46ec-8941-bbdaa84be2a0"/>
@@ -25120,12 +25121,6 @@
 </ct:contentTypeSchema>
 </file>
 
-<file path=customXml/item2.xml><?xml version="1.0" encoding="utf-8"?>
-<p:properties xmlns:p="http://schemas.microsoft.com/office/2006/metadata/properties" xmlns:xsi="http://www.w3.org/2001/XMLSchema-instance" xmlns:pc="http://schemas.microsoft.com/office/infopath/2007/PartnerControls">
-  <documentManagement/>
-</p:properties>
-</file>
-
 <file path=customXml/item3.xml><?xml version="1.0" encoding="utf-8"?>
 <?mso-contentType ?>
 <FormTemplates xmlns="http://schemas.microsoft.com/sharepoint/v3/contenttype/forms">
@@ -25136,6 +25131,15 @@
 </file>
 
 <file path=customXml/itemProps1.xml><?xml version="1.0" encoding="utf-8"?>
+<ds:datastoreItem xmlns:ds="http://schemas.openxmlformats.org/officeDocument/2006/customXml" ds:itemID="{1ED6C778-C4AA-4A66-B6B5-60690C5199CD}">
+  <ds:schemaRefs>
+    <ds:schemaRef ds:uri="http://schemas.microsoft.com/office/2006/metadata/properties"/>
+    <ds:schemaRef ds:uri="http://schemas.microsoft.com/office/infopath/2007/PartnerControls"/>
+  </ds:schemaRefs>
+</ds:datastoreItem>
+</file>
+
+<file path=customXml/itemProps2.xml><?xml version="1.0" encoding="utf-8"?>
 <ds:datastoreItem xmlns:ds="http://schemas.openxmlformats.org/officeDocument/2006/customXml" ds:itemID="{C9AC8E36-112B-4773-8318-FE4A82DF39EC}">
   <ds:schemaRefs>
     <ds:schemaRef ds:uri="http://schemas.microsoft.com/office/2006/metadata/contentType"/>
@@ -25153,15 +25157,6 @@
 </ds:datastoreItem>
 </file>
 
-<file path=customXml/itemProps2.xml><?xml version="1.0" encoding="utf-8"?>
-<ds:datastoreItem xmlns:ds="http://schemas.openxmlformats.org/officeDocument/2006/customXml" ds:itemID="{1ED6C778-C4AA-4A66-B6B5-60690C5199CD}">
-  <ds:schemaRefs>
-    <ds:schemaRef ds:uri="http://schemas.microsoft.com/office/2006/metadata/properties"/>
-    <ds:schemaRef ds:uri="http://schemas.microsoft.com/office/infopath/2007/PartnerControls"/>
-  </ds:schemaRefs>
-</ds:datastoreItem>
-</file>
-
 <file path=customXml/itemProps3.xml><?xml version="1.0" encoding="utf-8"?>
 <ds:datastoreItem xmlns:ds="http://schemas.openxmlformats.org/officeDocument/2006/customXml" ds:itemID="{C98144AE-B0E9-4A9D-8BA0-7C7CD27128C4}">
   <ds:schemaRefs>

</xml_diff>